<commit_message>
Longest mountain #845 solution
</commit_message>
<xml_diff>
--- a/70 Leetcode problems in all topics.pptx
+++ b/70 Leetcode problems in all topics.pptx
@@ -5,7 +5,7 @@
     <p:sldMasterId id="2147483648" r:id="rId1"/>
   </p:sldMasterIdLst>
   <p:notesMasterIdLst>
-    <p:notesMasterId r:id="rId10"/>
+    <p:notesMasterId r:id="rId11"/>
   </p:notesMasterIdLst>
   <p:sldIdLst>
     <p:sldId id="257" r:id="rId2"/>
@@ -15,7 +15,8 @@
     <p:sldId id="262" r:id="rId6"/>
     <p:sldId id="263" r:id="rId7"/>
     <p:sldId id="264" r:id="rId8"/>
-    <p:sldId id="260" r:id="rId9"/>
+    <p:sldId id="265" r:id="rId9"/>
+    <p:sldId id="260" r:id="rId10"/>
   </p:sldIdLst>
   <p:sldSz cx="12192000" cy="6858000"/>
   <p:notesSz cx="6858000" cy="9144000"/>
@@ -204,7 +205,7 @@
           <a:p>
             <a:fld id="{F7A7A88A-BD69-4FB2-BF26-8B1A821B3245}" type="datetimeFigureOut">
               <a:rPr lang="en-IN" smtClean="0"/>
-              <a:t>26-12-2024</a:t>
+              <a:t>27-12-2024</a:t>
             </a:fld>
             <a:endParaRPr lang="en-IN"/>
           </a:p>
@@ -698,7 +699,7 @@
           <a:p>
             <a:fld id="{5A069CB8-F204-4D06-B913-C5A26A89888A}" type="datetimeFigureOut">
               <a:rPr lang="en-US" dirty="0"/>
-              <a:t>12/26/2024</a:t>
+              <a:t>12/27/2024</a:t>
             </a:fld>
             <a:endParaRPr lang="en-US" dirty="0"/>
           </a:p>
@@ -901,7 +902,7 @@
           <a:p>
             <a:fld id="{50B6E300-0A13-4A81-945A-7333C271A069}" type="datetimeFigureOut">
               <a:rPr lang="en-US" dirty="0"/>
-              <a:t>12/26/2024</a:t>
+              <a:t>12/27/2024</a:t>
             </a:fld>
             <a:endParaRPr lang="en-US" dirty="0"/>
           </a:p>
@@ -1152,7 +1153,7 @@
           <a:p>
             <a:fld id="{34671962-1EA4-46E7-BCB0-F36CE46D1A59}" type="datetimeFigureOut">
               <a:rPr lang="en-US" dirty="0"/>
-              <a:t>12/26/2024</a:t>
+              <a:t>12/27/2024</a:t>
             </a:fld>
             <a:endParaRPr lang="en-US" dirty="0"/>
           </a:p>
@@ -1317,7 +1318,7 @@
           <a:p>
             <a:fld id="{D30BB376-B19C-488D-ABEB-03C7E6E9E3E0}" type="datetimeFigureOut">
               <a:rPr lang="en-US" dirty="0"/>
-              <a:t>12/26/2024</a:t>
+              <a:t>12/27/2024</a:t>
             </a:fld>
             <a:endParaRPr lang="en-US" dirty="0"/>
           </a:p>
@@ -1655,7 +1656,7 @@
           <a:p>
             <a:fld id="{486F077B-A50F-4D64-8574-E2D6A98A5553}" type="datetimeFigureOut">
               <a:rPr lang="en-US" dirty="0"/>
-              <a:t>12/26/2024</a:t>
+              <a:t>12/27/2024</a:t>
             </a:fld>
             <a:endParaRPr lang="en-US" dirty="0"/>
           </a:p>
@@ -1925,7 +1926,7 @@
           <a:p>
             <a:fld id="{7D9E2A62-1983-43A1-A163-D8AA46534C80}" type="datetimeFigureOut">
               <a:rPr lang="en-US" dirty="0"/>
-              <a:t>12/26/2024</a:t>
+              <a:t>12/27/2024</a:t>
             </a:fld>
             <a:endParaRPr lang="en-US" dirty="0"/>
           </a:p>
@@ -2299,7 +2300,7 @@
           <a:p>
             <a:fld id="{898F3E3B-34E3-4345-B2A1-994B83598A9C}" type="datetimeFigureOut">
               <a:rPr lang="en-US" dirty="0"/>
-              <a:t>12/26/2024</a:t>
+              <a:t>12/27/2024</a:t>
             </a:fld>
             <a:endParaRPr lang="en-US" dirty="0"/>
           </a:p>
@@ -2412,7 +2413,7 @@
           <a:p>
             <a:fld id="{FD816C96-82A1-4D77-8ADA-627AC6FE3D65}" type="datetimeFigureOut">
               <a:rPr lang="en-US" dirty="0"/>
-              <a:t>12/26/2024</a:t>
+              <a:t>12/27/2024</a:t>
             </a:fld>
             <a:endParaRPr lang="en-US" dirty="0"/>
           </a:p>
@@ -2578,7 +2579,7 @@
           <a:p>
             <a:fld id="{1D102C1E-28F2-47E9-802D-339E64E2F920}" type="datetimeFigureOut">
               <a:rPr lang="en-US" dirty="0"/>
-              <a:t>12/26/2024</a:t>
+              <a:t>12/27/2024</a:t>
             </a:fld>
             <a:endParaRPr lang="en-US" dirty="0"/>
           </a:p>
@@ -2928,7 +2929,7 @@
           <a:p>
             <a:fld id="{24271A48-F18A-45B3-BC05-1E27DA3F88AF}" type="datetimeFigureOut">
               <a:rPr lang="en-US" dirty="0"/>
-              <a:t>12/26/2024</a:t>
+              <a:t>12/27/2024</a:t>
             </a:fld>
             <a:endParaRPr lang="en-US" dirty="0"/>
           </a:p>
@@ -3301,7 +3302,7 @@
           <a:p>
             <a:fld id="{65B747F8-9654-4282-85D2-65F41AAE7A75}" type="datetimeFigureOut">
               <a:rPr lang="en-US" dirty="0"/>
-              <a:t>12/26/2024</a:t>
+              <a:t>12/27/2024</a:t>
             </a:fld>
             <a:endParaRPr lang="en-US" dirty="0"/>
           </a:p>
@@ -3583,7 +3584,7 @@
           <a:p>
             <a:fld id="{5DC5B261-8843-42D1-AAFC-05E20E2D9B97}" type="datetimeFigureOut">
               <a:rPr lang="en-US" dirty="0"/>
-              <a:t>12/26/2024</a:t>
+              <a:t>12/27/2024</a:t>
             </a:fld>
             <a:endParaRPr lang="en-US" dirty="0"/>
           </a:p>
@@ -5079,6 +5080,185 @@
 </file>
 
 <file path=ppt/slides/slide8.xml><?xml version="1.0" encoding="utf-8"?>
+<p:sld xmlns:a="http://schemas.openxmlformats.org/drawingml/2006/main" xmlns:r="http://schemas.openxmlformats.org/officeDocument/2006/relationships" xmlns:p="http://schemas.openxmlformats.org/presentationml/2006/main">
+  <p:cSld>
+    <p:spTree>
+      <p:nvGrpSpPr>
+        <p:cNvPr id="1" name=""/>
+        <p:cNvGrpSpPr/>
+        <p:nvPr/>
+      </p:nvGrpSpPr>
+      <p:grpSpPr>
+        <a:xfrm>
+          <a:off x="0" y="0"/>
+          <a:ext cx="0" cy="0"/>
+          <a:chOff x="0" y="0"/>
+          <a:chExt cx="0" cy="0"/>
+        </a:xfrm>
+      </p:grpSpPr>
+      <p:sp>
+        <p:nvSpPr>
+          <p:cNvPr id="8" name="Rectangle 7"/>
+          <p:cNvSpPr/>
+          <p:nvPr/>
+        </p:nvSpPr>
+        <p:spPr>
+          <a:xfrm>
+            <a:off x="281354" y="1151792"/>
+            <a:ext cx="11526715" cy="5037992"/>
+          </a:xfrm>
+          <a:prstGeom prst="rect">
+            <a:avLst/>
+          </a:prstGeom>
+        </p:spPr>
+        <p:style>
+          <a:lnRef idx="2">
+            <a:schemeClr val="accent1"/>
+          </a:lnRef>
+          <a:fillRef idx="1">
+            <a:schemeClr val="lt1"/>
+          </a:fillRef>
+          <a:effectRef idx="0">
+            <a:schemeClr val="accent1"/>
+          </a:effectRef>
+          <a:fontRef idx="minor">
+            <a:schemeClr val="dk1"/>
+          </a:fontRef>
+        </p:style>
+        <p:txBody>
+          <a:bodyPr rtlCol="0" anchor="ctr"/>
+          <a:lstStyle/>
+          <a:p>
+            <a:pPr algn="ctr"/>
+            <a:endParaRPr lang="en-IN"/>
+          </a:p>
+        </p:txBody>
+      </p:sp>
+      <p:sp>
+        <p:nvSpPr>
+          <p:cNvPr id="2" name="TextBox 1"/>
+          <p:cNvSpPr txBox="1"/>
+          <p:nvPr/>
+        </p:nvSpPr>
+        <p:spPr>
+          <a:xfrm>
+            <a:off x="281354" y="270408"/>
+            <a:ext cx="11910646" cy="707886"/>
+          </a:xfrm>
+          <a:prstGeom prst="rect">
+            <a:avLst/>
+          </a:prstGeom>
+          <a:noFill/>
+        </p:spPr>
+        <p:txBody>
+          <a:bodyPr wrap="square" rtlCol="0">
+            <a:spAutoFit/>
+          </a:bodyPr>
+          <a:lstStyle/>
+          <a:p>
+            <a:r>
+              <a:rPr lang="en-IN" sz="4000" b="1" dirty="0">
+                <a:hlinkClick r:id="rId2"/>
+              </a:rPr>
+              <a:t>Longest Mountain in Array</a:t>
+            </a:r>
+            <a:endParaRPr lang="en-US" sz="4000" b="1" dirty="0"/>
+          </a:p>
+        </p:txBody>
+      </p:sp>
+      <p:pic>
+        <p:nvPicPr>
+          <p:cNvPr id="6" name="Picture 5"/>
+          <p:cNvPicPr>
+            <a:picLocks noChangeAspect="1"/>
+          </p:cNvPicPr>
+          <p:nvPr/>
+        </p:nvPicPr>
+        <p:blipFill>
+          <a:blip r:embed="rId3"/>
+          <a:stretch>
+            <a:fillRect/>
+          </a:stretch>
+        </p:blipFill>
+        <p:spPr>
+          <a:xfrm>
+            <a:off x="578499" y="1630746"/>
+            <a:ext cx="3933569" cy="3448129"/>
+          </a:xfrm>
+          <a:prstGeom prst="rect">
+            <a:avLst/>
+          </a:prstGeom>
+        </p:spPr>
+      </p:pic>
+      <p:pic>
+        <p:nvPicPr>
+          <p:cNvPr id="7" name="Picture 6"/>
+          <p:cNvPicPr>
+            <a:picLocks noChangeAspect="1"/>
+          </p:cNvPicPr>
+          <p:nvPr/>
+        </p:nvPicPr>
+        <p:blipFill>
+          <a:blip r:embed="rId4"/>
+          <a:stretch>
+            <a:fillRect/>
+          </a:stretch>
+        </p:blipFill>
+        <p:spPr>
+          <a:xfrm>
+            <a:off x="8928712" y="2086538"/>
+            <a:ext cx="2776721" cy="2317511"/>
+          </a:xfrm>
+          <a:prstGeom prst="rect">
+            <a:avLst/>
+          </a:prstGeom>
+        </p:spPr>
+      </p:pic>
+      <p:pic>
+        <p:nvPicPr>
+          <p:cNvPr id="9" name="Picture 8"/>
+          <p:cNvPicPr>
+            <a:picLocks noChangeAspect="1"/>
+          </p:cNvPicPr>
+          <p:nvPr/>
+        </p:nvPicPr>
+        <p:blipFill>
+          <a:blip r:embed="rId5"/>
+          <a:stretch>
+            <a:fillRect/>
+          </a:stretch>
+        </p:blipFill>
+        <p:spPr>
+          <a:xfrm>
+            <a:off x="4669040" y="1761033"/>
+            <a:ext cx="4102699" cy="2968520"/>
+          </a:xfrm>
+          <a:prstGeom prst="rect">
+            <a:avLst/>
+          </a:prstGeom>
+        </p:spPr>
+      </p:pic>
+    </p:spTree>
+    <p:extLst>
+      <p:ext uri="{BB962C8B-B14F-4D97-AF65-F5344CB8AC3E}">
+        <p14:creationId xmlns:p14="http://schemas.microsoft.com/office/powerpoint/2010/main" val="1292657301"/>
+      </p:ext>
+    </p:extLst>
+  </p:cSld>
+  <p:clrMapOvr>
+    <a:masterClrMapping/>
+  </p:clrMapOvr>
+  <p:timing>
+    <p:tnLst>
+      <p:par>
+        <p:cTn id="1" dur="indefinite" restart="never" nodeType="tmRoot"/>
+      </p:par>
+    </p:tnLst>
+  </p:timing>
+</p:sld>
+</file>
+
+<file path=ppt/slides/slide9.xml><?xml version="1.0" encoding="utf-8"?>
 <p:sld xmlns:a="http://schemas.openxmlformats.org/drawingml/2006/main" xmlns:r="http://schemas.openxmlformats.org/officeDocument/2006/relationships" xmlns:p="http://schemas.openxmlformats.org/presentationml/2006/main">
   <p:cSld>
     <p:spTree>

</xml_diff>